<commit_message>
Presentation asd 	- Presentation nearly finished (Kontaktlos graphic missing) 	- Added Prestentation Text
</commit_message>
<xml_diff>
--- a/resources/Car Profile Sync.pptx
+++ b/resources/Car Profile Sync.pptx
@@ -3741,7 +3741,7 @@
           <p:nvPr/>
         </p:nvSpPr>
         <p:spPr>
-          <a:xfrm rot="21540732">
+          <a:xfrm>
             <a:off x="2414051" y="3110442"/>
             <a:ext cx="962123" cy="369332"/>
           </a:xfrm>
@@ -3758,7 +3758,11 @@
           <a:p>
             <a:r>
               <a:rPr lang="de-DE" dirty="0" smtClean="0"/>
-              <a:t>   0-Click</a:t>
+              <a:t>   </a:t>
+            </a:r>
+            <a:r>
+              <a:rPr lang="de-DE" dirty="0" smtClean="0"/>
+              <a:t>1-Click</a:t>
             </a:r>
             <a:endParaRPr lang="de-DE" dirty="0"/>
           </a:p>
@@ -3777,9 +3781,354 @@
   <p:timing>
     <p:tnLst>
       <p:par>
-        <p:cTn id="1" dur="indefinite" restart="never" nodeType="tmRoot"/>
+        <p:cTn id="1" dur="indefinite" restart="never" nodeType="tmRoot">
+          <p:childTnLst>
+            <p:seq concurrent="1" nextAc="seek">
+              <p:cTn id="2" dur="indefinite" nodeType="mainSeq">
+                <p:childTnLst>
+                  <p:par>
+                    <p:cTn id="3" fill="hold">
+                      <p:stCondLst>
+                        <p:cond delay="indefinite"/>
+                      </p:stCondLst>
+                      <p:childTnLst>
+                        <p:par>
+                          <p:cTn id="4" fill="hold">
+                            <p:stCondLst>
+                              <p:cond delay="0"/>
+                            </p:stCondLst>
+                            <p:childTnLst>
+                              <p:par>
+                                <p:cTn id="5" presetID="10" presetClass="entr" presetSubtype="0" fill="hold" nodeType="clickEffect">
+                                  <p:stCondLst>
+                                    <p:cond delay="0"/>
+                                  </p:stCondLst>
+                                  <p:childTnLst>
+                                    <p:set>
+                                      <p:cBhvr>
+                                        <p:cTn id="6" dur="1" fill="hold">
+                                          <p:stCondLst>
+                                            <p:cond delay="0"/>
+                                          </p:stCondLst>
+                                        </p:cTn>
+                                        <p:tgtEl>
+                                          <p:spTgt spid="5"/>
+                                        </p:tgtEl>
+                                        <p:attrNameLst>
+                                          <p:attrName>style.visibility</p:attrName>
+                                        </p:attrNameLst>
+                                      </p:cBhvr>
+                                      <p:to>
+                                        <p:strVal val="visible"/>
+                                      </p:to>
+                                    </p:set>
+                                    <p:animEffect transition="in" filter="fade">
+                                      <p:cBhvr>
+                                        <p:cTn id="7" dur="500"/>
+                                        <p:tgtEl>
+                                          <p:spTgt spid="5"/>
+                                        </p:tgtEl>
+                                      </p:cBhvr>
+                                    </p:animEffect>
+                                  </p:childTnLst>
+                                </p:cTn>
+                              </p:par>
+                              <p:par>
+                                <p:cTn id="8" presetID="10" presetClass="entr" presetSubtype="0" fill="hold" nodeType="withEffect">
+                                  <p:stCondLst>
+                                    <p:cond delay="0"/>
+                                  </p:stCondLst>
+                                  <p:childTnLst>
+                                    <p:set>
+                                      <p:cBhvr>
+                                        <p:cTn id="9" dur="1" fill="hold">
+                                          <p:stCondLst>
+                                            <p:cond delay="0"/>
+                                          </p:stCondLst>
+                                        </p:cTn>
+                                        <p:tgtEl>
+                                          <p:spTgt spid="1034"/>
+                                        </p:tgtEl>
+                                        <p:attrNameLst>
+                                          <p:attrName>style.visibility</p:attrName>
+                                        </p:attrNameLst>
+                                      </p:cBhvr>
+                                      <p:to>
+                                        <p:strVal val="visible"/>
+                                      </p:to>
+                                    </p:set>
+                                    <p:animEffect transition="in" filter="fade">
+                                      <p:cBhvr>
+                                        <p:cTn id="10" dur="500"/>
+                                        <p:tgtEl>
+                                          <p:spTgt spid="1034"/>
+                                        </p:tgtEl>
+                                      </p:cBhvr>
+                                    </p:animEffect>
+                                  </p:childTnLst>
+                                </p:cTn>
+                              </p:par>
+                            </p:childTnLst>
+                          </p:cTn>
+                        </p:par>
+                      </p:childTnLst>
+                    </p:cTn>
+                  </p:par>
+                  <p:par>
+                    <p:cTn id="11" fill="hold">
+                      <p:stCondLst>
+                        <p:cond delay="indefinite"/>
+                      </p:stCondLst>
+                      <p:childTnLst>
+                        <p:par>
+                          <p:cTn id="12" fill="hold">
+                            <p:stCondLst>
+                              <p:cond delay="0"/>
+                            </p:stCondLst>
+                            <p:childTnLst>
+                              <p:par>
+                                <p:cTn id="13" presetID="10" presetClass="entr" presetSubtype="0" fill="hold" grpId="0" nodeType="clickEffect">
+                                  <p:stCondLst>
+                                    <p:cond delay="0"/>
+                                  </p:stCondLst>
+                                  <p:childTnLst>
+                                    <p:set>
+                                      <p:cBhvr>
+                                        <p:cTn id="14" dur="1" fill="hold">
+                                          <p:stCondLst>
+                                            <p:cond delay="0"/>
+                                          </p:stCondLst>
+                                        </p:cTn>
+                                        <p:tgtEl>
+                                          <p:spTgt spid="17"/>
+                                        </p:tgtEl>
+                                        <p:attrNameLst>
+                                          <p:attrName>style.visibility</p:attrName>
+                                        </p:attrNameLst>
+                                      </p:cBhvr>
+                                      <p:to>
+                                        <p:strVal val="visible"/>
+                                      </p:to>
+                                    </p:set>
+                                    <p:animEffect transition="in" filter="fade">
+                                      <p:cBhvr>
+                                        <p:cTn id="15" dur="500"/>
+                                        <p:tgtEl>
+                                          <p:spTgt spid="17"/>
+                                        </p:tgtEl>
+                                      </p:cBhvr>
+                                    </p:animEffect>
+                                  </p:childTnLst>
+                                </p:cTn>
+                              </p:par>
+                              <p:par>
+                                <p:cTn id="16" presetID="10" presetClass="entr" presetSubtype="0" fill="hold" nodeType="withEffect">
+                                  <p:stCondLst>
+                                    <p:cond delay="0"/>
+                                  </p:stCondLst>
+                                  <p:childTnLst>
+                                    <p:set>
+                                      <p:cBhvr>
+                                        <p:cTn id="17" dur="1" fill="hold">
+                                          <p:stCondLst>
+                                            <p:cond delay="0"/>
+                                          </p:stCondLst>
+                                        </p:cTn>
+                                        <p:tgtEl>
+                                          <p:spTgt spid="1028"/>
+                                        </p:tgtEl>
+                                        <p:attrNameLst>
+                                          <p:attrName>style.visibility</p:attrName>
+                                        </p:attrNameLst>
+                                      </p:cBhvr>
+                                      <p:to>
+                                        <p:strVal val="visible"/>
+                                      </p:to>
+                                    </p:set>
+                                    <p:animEffect transition="in" filter="fade">
+                                      <p:cBhvr>
+                                        <p:cTn id="18" dur="500"/>
+                                        <p:tgtEl>
+                                          <p:spTgt spid="1028"/>
+                                        </p:tgtEl>
+                                      </p:cBhvr>
+                                    </p:animEffect>
+                                  </p:childTnLst>
+                                </p:cTn>
+                              </p:par>
+                              <p:par>
+                                <p:cTn id="19" presetID="10" presetClass="entr" presetSubtype="0" fill="hold" grpId="0" nodeType="withEffect">
+                                  <p:stCondLst>
+                                    <p:cond delay="0"/>
+                                  </p:stCondLst>
+                                  <p:childTnLst>
+                                    <p:set>
+                                      <p:cBhvr>
+                                        <p:cTn id="20" dur="1" fill="hold">
+                                          <p:stCondLst>
+                                            <p:cond delay="0"/>
+                                          </p:stCondLst>
+                                        </p:cTn>
+                                        <p:tgtEl>
+                                          <p:spTgt spid="16"/>
+                                        </p:tgtEl>
+                                        <p:attrNameLst>
+                                          <p:attrName>style.visibility</p:attrName>
+                                        </p:attrNameLst>
+                                      </p:cBhvr>
+                                      <p:to>
+                                        <p:strVal val="visible"/>
+                                      </p:to>
+                                    </p:set>
+                                    <p:animEffect transition="in" filter="fade">
+                                      <p:cBhvr>
+                                        <p:cTn id="21" dur="500"/>
+                                        <p:tgtEl>
+                                          <p:spTgt spid="16"/>
+                                        </p:tgtEl>
+                                      </p:cBhvr>
+                                    </p:animEffect>
+                                  </p:childTnLst>
+                                </p:cTn>
+                              </p:par>
+                              <p:par>
+                                <p:cTn id="22" presetID="10" presetClass="entr" presetSubtype="0" fill="hold" grpId="0" nodeType="withEffect">
+                                  <p:stCondLst>
+                                    <p:cond delay="0"/>
+                                  </p:stCondLst>
+                                  <p:childTnLst>
+                                    <p:set>
+                                      <p:cBhvr>
+                                        <p:cTn id="23" dur="1" fill="hold">
+                                          <p:stCondLst>
+                                            <p:cond delay="0"/>
+                                          </p:stCondLst>
+                                        </p:cTn>
+                                        <p:tgtEl>
+                                          <p:spTgt spid="20"/>
+                                        </p:tgtEl>
+                                        <p:attrNameLst>
+                                          <p:attrName>style.visibility</p:attrName>
+                                        </p:attrNameLst>
+                                      </p:cBhvr>
+                                      <p:to>
+                                        <p:strVal val="visible"/>
+                                      </p:to>
+                                    </p:set>
+                                    <p:animEffect transition="in" filter="fade">
+                                      <p:cBhvr>
+                                        <p:cTn id="24" dur="500"/>
+                                        <p:tgtEl>
+                                          <p:spTgt spid="20"/>
+                                        </p:tgtEl>
+                                      </p:cBhvr>
+                                    </p:animEffect>
+                                  </p:childTnLst>
+                                </p:cTn>
+                              </p:par>
+                              <p:par>
+                                <p:cTn id="25" presetID="10" presetClass="entr" presetSubtype="0" fill="hold" nodeType="withEffect">
+                                  <p:stCondLst>
+                                    <p:cond delay="0"/>
+                                  </p:stCondLst>
+                                  <p:childTnLst>
+                                    <p:set>
+                                      <p:cBhvr>
+                                        <p:cTn id="26" dur="1" fill="hold">
+                                          <p:stCondLst>
+                                            <p:cond delay="0"/>
+                                          </p:stCondLst>
+                                        </p:cTn>
+                                        <p:tgtEl>
+                                          <p:spTgt spid="1036"/>
+                                        </p:tgtEl>
+                                        <p:attrNameLst>
+                                          <p:attrName>style.visibility</p:attrName>
+                                        </p:attrNameLst>
+                                      </p:cBhvr>
+                                      <p:to>
+                                        <p:strVal val="visible"/>
+                                      </p:to>
+                                    </p:set>
+                                    <p:animEffect transition="in" filter="fade">
+                                      <p:cBhvr>
+                                        <p:cTn id="27" dur="500"/>
+                                        <p:tgtEl>
+                                          <p:spTgt spid="1036"/>
+                                        </p:tgtEl>
+                                      </p:cBhvr>
+                                    </p:animEffect>
+                                  </p:childTnLst>
+                                </p:cTn>
+                              </p:par>
+                              <p:par>
+                                <p:cTn id="28" presetID="10" presetClass="entr" presetSubtype="0" fill="hold" grpId="0" nodeType="withEffect">
+                                  <p:stCondLst>
+                                    <p:cond delay="0"/>
+                                  </p:stCondLst>
+                                  <p:childTnLst>
+                                    <p:set>
+                                      <p:cBhvr>
+                                        <p:cTn id="29" dur="1" fill="hold">
+                                          <p:stCondLst>
+                                            <p:cond delay="0"/>
+                                          </p:stCondLst>
+                                        </p:cTn>
+                                        <p:tgtEl>
+                                          <p:spTgt spid="19"/>
+                                        </p:tgtEl>
+                                        <p:attrNameLst>
+                                          <p:attrName>style.visibility</p:attrName>
+                                        </p:attrNameLst>
+                                      </p:cBhvr>
+                                      <p:to>
+                                        <p:strVal val="visible"/>
+                                      </p:to>
+                                    </p:set>
+                                    <p:animEffect transition="in" filter="fade">
+                                      <p:cBhvr>
+                                        <p:cTn id="30" dur="500"/>
+                                        <p:tgtEl>
+                                          <p:spTgt spid="19"/>
+                                        </p:tgtEl>
+                                      </p:cBhvr>
+                                    </p:animEffect>
+                                  </p:childTnLst>
+                                </p:cTn>
+                              </p:par>
+                            </p:childTnLst>
+                          </p:cTn>
+                        </p:par>
+                      </p:childTnLst>
+                    </p:cTn>
+                  </p:par>
+                </p:childTnLst>
+              </p:cTn>
+              <p:prevCondLst>
+                <p:cond evt="onPrev" delay="0">
+                  <p:tgtEl>
+                    <p:sldTgt/>
+                  </p:tgtEl>
+                </p:cond>
+              </p:prevCondLst>
+              <p:nextCondLst>
+                <p:cond evt="onNext" delay="0">
+                  <p:tgtEl>
+                    <p:sldTgt/>
+                  </p:tgtEl>
+                </p:cond>
+              </p:nextCondLst>
+            </p:seq>
+          </p:childTnLst>
+        </p:cTn>
       </p:par>
     </p:tnLst>
+    <p:bldLst>
+      <p:bldP spid="16" grpId="0" animBg="1"/>
+      <p:bldP spid="17" grpId="0"/>
+      <p:bldP spid="19" grpId="0" animBg="1"/>
+      <p:bldP spid="20" grpId="0"/>
+    </p:bldLst>
   </p:timing>
 </p:sld>
 </file>
@@ -4000,7 +4349,7 @@
             <a:pPr algn="ctr"/>
             <a:r>
               <a:rPr lang="de-DE" sz="3600" b="1" dirty="0" smtClean="0"/>
-              <a:t>Kontaktlos</a:t>
+              <a:t>Einfachheit</a:t>
             </a:r>
             <a:endParaRPr lang="de-DE" b="1" dirty="0"/>
           </a:p>
@@ -4060,9 +4409,247 @@
   <p:timing>
     <p:tnLst>
       <p:par>
-        <p:cTn id="1" dur="indefinite" restart="never" nodeType="tmRoot"/>
+        <p:cTn id="1" dur="indefinite" restart="never" nodeType="tmRoot">
+          <p:childTnLst>
+            <p:seq concurrent="1" nextAc="seek">
+              <p:cTn id="2" dur="indefinite" nodeType="mainSeq">
+                <p:childTnLst>
+                  <p:par>
+                    <p:cTn id="3" fill="hold">
+                      <p:stCondLst>
+                        <p:cond delay="indefinite"/>
+                      </p:stCondLst>
+                      <p:childTnLst>
+                        <p:par>
+                          <p:cTn id="4" fill="hold">
+                            <p:stCondLst>
+                              <p:cond delay="0"/>
+                            </p:stCondLst>
+                            <p:childTnLst>
+                              <p:par>
+                                <p:cTn id="5" presetID="10" presetClass="entr" presetSubtype="0" fill="hold" nodeType="clickEffect">
+                                  <p:stCondLst>
+                                    <p:cond delay="0"/>
+                                  </p:stCondLst>
+                                  <p:childTnLst>
+                                    <p:set>
+                                      <p:cBhvr>
+                                        <p:cTn id="6" dur="1" fill="hold">
+                                          <p:stCondLst>
+                                            <p:cond delay="0"/>
+                                          </p:stCondLst>
+                                        </p:cTn>
+                                        <p:tgtEl>
+                                          <p:spTgt spid="4"/>
+                                        </p:tgtEl>
+                                        <p:attrNameLst>
+                                          <p:attrName>style.visibility</p:attrName>
+                                        </p:attrNameLst>
+                                      </p:cBhvr>
+                                      <p:to>
+                                        <p:strVal val="visible"/>
+                                      </p:to>
+                                    </p:set>
+                                    <p:animEffect transition="in" filter="fade">
+                                      <p:cBhvr>
+                                        <p:cTn id="7" dur="500"/>
+                                        <p:tgtEl>
+                                          <p:spTgt spid="4"/>
+                                        </p:tgtEl>
+                                      </p:cBhvr>
+                                    </p:animEffect>
+                                  </p:childTnLst>
+                                </p:cTn>
+                              </p:par>
+                              <p:par>
+                                <p:cTn id="8" presetID="10" presetClass="entr" presetSubtype="0" fill="hold" grpId="0" nodeType="withEffect">
+                                  <p:stCondLst>
+                                    <p:cond delay="0"/>
+                                  </p:stCondLst>
+                                  <p:childTnLst>
+                                    <p:set>
+                                      <p:cBhvr>
+                                        <p:cTn id="9" dur="1" fill="hold">
+                                          <p:stCondLst>
+                                            <p:cond delay="0"/>
+                                          </p:stCondLst>
+                                        </p:cTn>
+                                        <p:tgtEl>
+                                          <p:spTgt spid="7"/>
+                                        </p:tgtEl>
+                                        <p:attrNameLst>
+                                          <p:attrName>style.visibility</p:attrName>
+                                        </p:attrNameLst>
+                                      </p:cBhvr>
+                                      <p:to>
+                                        <p:strVal val="visible"/>
+                                      </p:to>
+                                    </p:set>
+                                    <p:animEffect transition="in" filter="fade">
+                                      <p:cBhvr>
+                                        <p:cTn id="10" dur="500"/>
+                                        <p:tgtEl>
+                                          <p:spTgt spid="7"/>
+                                        </p:tgtEl>
+                                      </p:cBhvr>
+                                    </p:animEffect>
+                                  </p:childTnLst>
+                                </p:cTn>
+                              </p:par>
+                            </p:childTnLst>
+                          </p:cTn>
+                        </p:par>
+                      </p:childTnLst>
+                    </p:cTn>
+                  </p:par>
+                  <p:par>
+                    <p:cTn id="11" fill="hold">
+                      <p:stCondLst>
+                        <p:cond delay="indefinite"/>
+                      </p:stCondLst>
+                      <p:childTnLst>
+                        <p:par>
+                          <p:cTn id="12" fill="hold">
+                            <p:stCondLst>
+                              <p:cond delay="0"/>
+                            </p:stCondLst>
+                            <p:childTnLst>
+                              <p:par>
+                                <p:cTn id="13" presetID="10" presetClass="entr" presetSubtype="0" fill="hold" nodeType="clickEffect">
+                                  <p:stCondLst>
+                                    <p:cond delay="0"/>
+                                  </p:stCondLst>
+                                  <p:childTnLst>
+                                    <p:set>
+                                      <p:cBhvr>
+                                        <p:cTn id="14" dur="1" fill="hold">
+                                          <p:stCondLst>
+                                            <p:cond delay="0"/>
+                                          </p:stCondLst>
+                                        </p:cTn>
+                                        <p:tgtEl>
+                                          <p:spTgt spid="2051"/>
+                                        </p:tgtEl>
+                                        <p:attrNameLst>
+                                          <p:attrName>style.visibility</p:attrName>
+                                        </p:attrNameLst>
+                                      </p:cBhvr>
+                                      <p:to>
+                                        <p:strVal val="visible"/>
+                                      </p:to>
+                                    </p:set>
+                                    <p:animEffect transition="in" filter="fade">
+                                      <p:cBhvr>
+                                        <p:cTn id="15" dur="500"/>
+                                        <p:tgtEl>
+                                          <p:spTgt spid="2051"/>
+                                        </p:tgtEl>
+                                      </p:cBhvr>
+                                    </p:animEffect>
+                                  </p:childTnLst>
+                                </p:cTn>
+                              </p:par>
+                              <p:par>
+                                <p:cTn id="16" presetID="10" presetClass="entr" presetSubtype="0" fill="hold" nodeType="withEffect">
+                                  <p:stCondLst>
+                                    <p:cond delay="0"/>
+                                  </p:stCondLst>
+                                  <p:childTnLst>
+                                    <p:set>
+                                      <p:cBhvr>
+                                        <p:cTn id="17" dur="1" fill="hold">
+                                          <p:stCondLst>
+                                            <p:cond delay="0"/>
+                                          </p:stCondLst>
+                                        </p:cTn>
+                                        <p:tgtEl>
+                                          <p:spTgt spid="6"/>
+                                        </p:tgtEl>
+                                        <p:attrNameLst>
+                                          <p:attrName>style.visibility</p:attrName>
+                                        </p:attrNameLst>
+                                      </p:cBhvr>
+                                      <p:to>
+                                        <p:strVal val="visible"/>
+                                      </p:to>
+                                    </p:set>
+                                    <p:animEffect transition="in" filter="fade">
+                                      <p:cBhvr>
+                                        <p:cTn id="18" dur="500"/>
+                                        <p:tgtEl>
+                                          <p:spTgt spid="6"/>
+                                        </p:tgtEl>
+                                      </p:cBhvr>
+                                    </p:animEffect>
+                                  </p:childTnLst>
+                                </p:cTn>
+                              </p:par>
+                              <p:par>
+                                <p:cTn id="19" presetID="10" presetClass="entr" presetSubtype="0" fill="hold" grpId="0" nodeType="withEffect">
+                                  <p:stCondLst>
+                                    <p:cond delay="0"/>
+                                  </p:stCondLst>
+                                  <p:childTnLst>
+                                    <p:set>
+                                      <p:cBhvr>
+                                        <p:cTn id="20" dur="1" fill="hold">
+                                          <p:stCondLst>
+                                            <p:cond delay="0"/>
+                                          </p:stCondLst>
+                                        </p:cTn>
+                                        <p:tgtEl>
+                                          <p:spTgt spid="8"/>
+                                        </p:tgtEl>
+                                        <p:attrNameLst>
+                                          <p:attrName>style.visibility</p:attrName>
+                                        </p:attrNameLst>
+                                      </p:cBhvr>
+                                      <p:to>
+                                        <p:strVal val="visible"/>
+                                      </p:to>
+                                    </p:set>
+                                    <p:animEffect transition="in" filter="fade">
+                                      <p:cBhvr>
+                                        <p:cTn id="21" dur="500"/>
+                                        <p:tgtEl>
+                                          <p:spTgt spid="8"/>
+                                        </p:tgtEl>
+                                      </p:cBhvr>
+                                    </p:animEffect>
+                                  </p:childTnLst>
+                                </p:cTn>
+                              </p:par>
+                            </p:childTnLst>
+                          </p:cTn>
+                        </p:par>
+                      </p:childTnLst>
+                    </p:cTn>
+                  </p:par>
+                </p:childTnLst>
+              </p:cTn>
+              <p:prevCondLst>
+                <p:cond evt="onPrev" delay="0">
+                  <p:tgtEl>
+                    <p:sldTgt/>
+                  </p:tgtEl>
+                </p:cond>
+              </p:prevCondLst>
+              <p:nextCondLst>
+                <p:cond evt="onNext" delay="0">
+                  <p:tgtEl>
+                    <p:sldTgt/>
+                  </p:tgtEl>
+                </p:cond>
+              </p:nextCondLst>
+            </p:seq>
+          </p:childTnLst>
+        </p:cTn>
       </p:par>
     </p:tnLst>
+    <p:bldLst>
+      <p:bldP spid="7" grpId="0"/>
+      <p:bldP spid="8" grpId="0"/>
+    </p:bldLst>
   </p:timing>
 </p:sld>
 </file>

</xml_diff>

<commit_message>
Presentation asd 	- small changes in Text & pptx
</commit_message>
<xml_diff>
--- a/resources/Car Profile Sync.pptx
+++ b/resources/Car Profile Sync.pptx
@@ -4396,6 +4396,47 @@
           </a:extLst>
         </p:spPr>
       </p:pic>
+      <p:pic>
+        <p:nvPicPr>
+          <p:cNvPr id="1026" name="Picture 2" descr="http://cnet3.cbsistatic.com/hub/i/r/2012/06/28/276dff8b-cbf2-11e2-9a4a-0291187b029a/resize/770x578/fad36287b5850e6edffe3ecd77ec2477/samsung-galaxy-s3-visa-nfc.jpg"/>
+          <p:cNvPicPr>
+            <a:picLocks noChangeAspect="1" noChangeArrowheads="1"/>
+          </p:cNvPicPr>
+          <p:nvPr/>
+        </p:nvPicPr>
+        <p:blipFill>
+          <a:blip r:embed="rId5" cstate="print">
+            <a:extLst>
+              <a:ext uri="{28A0092B-C50C-407E-A947-70E740481C1C}">
+                <a14:useLocalDpi xmlns:a14="http://schemas.microsoft.com/office/drawing/2010/main" val="0"/>
+              </a:ext>
+            </a:extLst>
+          </a:blip>
+          <a:srcRect/>
+          <a:stretch>
+            <a:fillRect/>
+          </a:stretch>
+        </p:blipFill>
+        <p:spPr bwMode="auto">
+          <a:xfrm>
+            <a:off x="580474" y="1822663"/>
+            <a:ext cx="2265161" cy="1694454"/>
+          </a:xfrm>
+          <a:prstGeom prst="rect">
+            <a:avLst/>
+          </a:prstGeom>
+          <a:noFill/>
+          <a:extLst>
+            <a:ext uri="{909E8E84-426E-40DD-AFC4-6F175D3DCCD1}">
+              <a14:hiddenFill xmlns:a14="http://schemas.microsoft.com/office/drawing/2010/main">
+                <a:solidFill>
+                  <a:srgbClr val="FFFFFF"/>
+                </a:solidFill>
+              </a14:hiddenFill>
+            </a:ext>
+          </a:extLst>
+        </p:spPr>
+      </p:pic>
     </p:spTree>
     <p:extLst>
       <p:ext uri="{BB962C8B-B14F-4D97-AF65-F5344CB8AC3E}">

</xml_diff>

<commit_message>
Presentation asd 	- Logo Resizing
</commit_message>
<xml_diff>
--- a/resources/Car Profile Sync.pptx
+++ b/resources/Car Profile Sync.pptx
@@ -3116,7 +3116,7 @@
         <p:spPr>
           <a:xfrm>
             <a:off x="35496" y="1829271"/>
-            <a:ext cx="7735888" cy="1102519"/>
+            <a:ext cx="9001000" cy="1102519"/>
           </a:xfrm>
         </p:spPr>
         <p:txBody>
@@ -3172,7 +3172,7 @@
           <p:nvPr/>
         </p:nvPicPr>
         <p:blipFill>
-          <a:blip r:embed="rId2">
+          <a:blip r:embed="rId2" cstate="print">
             <a:extLst>
               <a:ext uri="{28A0092B-C50C-407E-A947-70E740481C1C}">
                 <a14:useLocalDpi xmlns:a14="http://schemas.microsoft.com/office/drawing/2010/main" val="0"/>
@@ -3186,8 +3186,8 @@
         </p:blipFill>
         <p:spPr bwMode="auto">
           <a:xfrm>
-            <a:off x="6012160" y="195486"/>
-            <a:ext cx="3472241" cy="2664296"/>
+            <a:off x="7524328" y="3579862"/>
+            <a:ext cx="1783042" cy="1368152"/>
           </a:xfrm>
           <a:prstGeom prst="rect">
             <a:avLst/>
@@ -4479,8 +4479,8 @@
         </p:blipFill>
         <p:spPr bwMode="auto">
           <a:xfrm>
-            <a:off x="821725" y="1365027"/>
-            <a:ext cx="1782660" cy="2609725"/>
+            <a:off x="716642" y="1114153"/>
+            <a:ext cx="1992825" cy="2917396"/>
           </a:xfrm>
           <a:prstGeom prst="rect">
             <a:avLst/>
@@ -4848,7 +4848,7 @@
       </p:sp>
       <p:pic>
         <p:nvPicPr>
-          <p:cNvPr id="4" name="Picture 2" descr="C:\Users\matschy\Documents\GitHub\codefest8\resources\logo\CarProfileSync2.png"/>
+          <p:cNvPr id="5" name="Picture 2" descr="C:\Users\matschy\Documents\GitHub\codefest8\resources\logo\CarProfileSync2.png"/>
           <p:cNvPicPr>
             <a:picLocks noChangeAspect="1" noChangeArrowheads="1"/>
           </p:cNvPicPr>
@@ -4869,8 +4869,8 @@
         </p:blipFill>
         <p:spPr bwMode="auto">
           <a:xfrm>
-            <a:off x="6948264" y="3291830"/>
-            <a:ext cx="2032081" cy="1559242"/>
+            <a:off x="7524328" y="3579862"/>
+            <a:ext cx="1783042" cy="1368152"/>
           </a:xfrm>
           <a:prstGeom prst="rect">
             <a:avLst/>

</xml_diff>